<commit_message>
Fixing share action provider to be unclickable if error. Also working on presentation
</commit_message>
<xml_diff>
--- a/Phunware_Weather_App_Presentation.pptx
+++ b/Phunware_Weather_App_Presentation.pptx
@@ -5,7 +5,7 @@
     <p:sldMasterId id="2147483659" r:id="rId1"/>
   </p:sldMasterIdLst>
   <p:notesMasterIdLst>
-    <p:notesMasterId r:id="rId17"/>
+    <p:notesMasterId r:id="rId19"/>
   </p:notesMasterIdLst>
   <p:sldIdLst>
     <p:sldId id="256" r:id="rId2"/>
@@ -17,12 +17,14 @@
     <p:sldId id="293" r:id="rId8"/>
     <p:sldId id="292" r:id="rId9"/>
     <p:sldId id="296" r:id="rId10"/>
-    <p:sldId id="297" r:id="rId11"/>
-    <p:sldId id="287" r:id="rId12"/>
-    <p:sldId id="284" r:id="rId13"/>
-    <p:sldId id="286" r:id="rId14"/>
-    <p:sldId id="294" r:id="rId15"/>
-    <p:sldId id="295" r:id="rId16"/>
+    <p:sldId id="298" r:id="rId11"/>
+    <p:sldId id="299" r:id="rId12"/>
+    <p:sldId id="297" r:id="rId13"/>
+    <p:sldId id="287" r:id="rId14"/>
+    <p:sldId id="284" r:id="rId15"/>
+    <p:sldId id="286" r:id="rId16"/>
+    <p:sldId id="294" r:id="rId17"/>
+    <p:sldId id="295" r:id="rId18"/>
   </p:sldIdLst>
   <p:sldSz cx="9144000" cy="5143500" type="screen16x9"/>
   <p:notesSz cx="6858000" cy="9144000"/>
@@ -700,7 +702,7 @@
   <p:cSld>
     <p:spTree>
       <p:nvGrpSpPr>
-        <p:cNvPr id="1" name="Shape 111"/>
+        <p:cNvPr id="1" name="Shape 75"/>
         <p:cNvGrpSpPr/>
         <p:nvPr/>
       </p:nvGrpSpPr>
@@ -714,7 +716,7 @@
       </p:grpSpPr>
       <p:sp>
         <p:nvSpPr>
-          <p:cNvPr id="112" name="Shape 112"/>
+          <p:cNvPr id="76" name="Shape 76"/>
           <p:cNvSpPr>
             <a:spLocks noGrp="1" noRot="1" noChangeAspect="1"/>
           </p:cNvSpPr>
@@ -755,7 +757,7 @@
       </p:sp>
       <p:sp>
         <p:nvSpPr>
-          <p:cNvPr id="113" name="Shape 113"/>
+          <p:cNvPr id="77" name="Shape 77"/>
           <p:cNvSpPr txBox="1">
             <a:spLocks noGrp="1"/>
           </p:cNvSpPr>
@@ -801,7 +803,7 @@
   <p:cSld>
     <p:spTree>
       <p:nvGrpSpPr>
-        <p:cNvPr id="1" name="Shape 254"/>
+        <p:cNvPr id="1" name="Shape 75"/>
         <p:cNvGrpSpPr/>
         <p:nvPr/>
       </p:nvGrpSpPr>
@@ -815,7 +817,7 @@
       </p:grpSpPr>
       <p:sp>
         <p:nvSpPr>
-          <p:cNvPr id="255" name="Shape 255"/>
+          <p:cNvPr id="76" name="Shape 76"/>
           <p:cNvSpPr>
             <a:spLocks noGrp="1" noRot="1" noChangeAspect="1"/>
           </p:cNvSpPr>
@@ -825,7 +827,7 @@
         </p:nvSpPr>
         <p:spPr>
           <a:xfrm>
-            <a:off x="381300" y="685800"/>
+            <a:off x="381000" y="685800"/>
             <a:ext cx="6096000" cy="3429000"/>
           </a:xfrm>
           <a:custGeom>
@@ -856,7 +858,7 @@
       </p:sp>
       <p:sp>
         <p:nvSpPr>
-          <p:cNvPr id="256" name="Shape 256"/>
+          <p:cNvPr id="77" name="Shape 77"/>
           <p:cNvSpPr txBox="1">
             <a:spLocks noGrp="1"/>
           </p:cNvSpPr>
@@ -902,7 +904,7 @@
   <p:cSld>
     <p:spTree>
       <p:nvGrpSpPr>
-        <p:cNvPr id="1" name="Shape 254"/>
+        <p:cNvPr id="1" name="Shape 111"/>
         <p:cNvGrpSpPr/>
         <p:nvPr/>
       </p:nvGrpSpPr>
@@ -916,7 +918,7 @@
       </p:grpSpPr>
       <p:sp>
         <p:nvSpPr>
-          <p:cNvPr id="255" name="Shape 255"/>
+          <p:cNvPr id="112" name="Shape 112"/>
           <p:cNvSpPr>
             <a:spLocks noGrp="1" noRot="1" noChangeAspect="1"/>
           </p:cNvSpPr>
@@ -957,7 +959,7 @@
       </p:sp>
       <p:sp>
         <p:nvSpPr>
-          <p:cNvPr id="256" name="Shape 256"/>
+          <p:cNvPr id="113" name="Shape 113"/>
           <p:cNvSpPr txBox="1">
             <a:spLocks noGrp="1"/>
           </p:cNvSpPr>
@@ -1003,7 +1005,7 @@
   <p:cSld>
     <p:spTree>
       <p:nvGrpSpPr>
-        <p:cNvPr id="1" name="Shape 111"/>
+        <p:cNvPr id="1" name="Shape 254"/>
         <p:cNvGrpSpPr/>
         <p:nvPr/>
       </p:nvGrpSpPr>
@@ -1017,7 +1019,7 @@
       </p:grpSpPr>
       <p:sp>
         <p:nvSpPr>
-          <p:cNvPr id="112" name="Shape 112"/>
+          <p:cNvPr id="255" name="Shape 255"/>
           <p:cNvSpPr>
             <a:spLocks noGrp="1" noRot="1" noChangeAspect="1"/>
           </p:cNvSpPr>
@@ -1027,7 +1029,7 @@
         </p:nvSpPr>
         <p:spPr>
           <a:xfrm>
-            <a:off x="381000" y="685800"/>
+            <a:off x="381300" y="685800"/>
             <a:ext cx="6096000" cy="3429000"/>
           </a:xfrm>
           <a:custGeom>
@@ -1058,7 +1060,7 @@
       </p:sp>
       <p:sp>
         <p:nvSpPr>
-          <p:cNvPr id="113" name="Shape 113"/>
+          <p:cNvPr id="256" name="Shape 256"/>
           <p:cNvSpPr txBox="1">
             <a:spLocks noGrp="1"/>
           </p:cNvSpPr>
@@ -1100,6 +1102,208 @@
 </file>
 
 <file path=ppt/notesSlides/notesSlide15.xml><?xml version="1.0" encoding="utf-8"?>
+<p:notes xmlns:a="http://schemas.openxmlformats.org/drawingml/2006/main" xmlns:r="http://schemas.openxmlformats.org/officeDocument/2006/relationships" xmlns:p="http://schemas.openxmlformats.org/presentationml/2006/main" showMasterSp="0" showMasterPhAnim="0">
+  <p:cSld>
+    <p:spTree>
+      <p:nvGrpSpPr>
+        <p:cNvPr id="1" name="Shape 254"/>
+        <p:cNvGrpSpPr/>
+        <p:nvPr/>
+      </p:nvGrpSpPr>
+      <p:grpSpPr>
+        <a:xfrm>
+          <a:off x="0" y="0"/>
+          <a:ext cx="0" cy="0"/>
+          <a:chOff x="0" y="0"/>
+          <a:chExt cx="0" cy="0"/>
+        </a:xfrm>
+      </p:grpSpPr>
+      <p:sp>
+        <p:nvSpPr>
+          <p:cNvPr id="255" name="Shape 255"/>
+          <p:cNvSpPr>
+            <a:spLocks noGrp="1" noRot="1" noChangeAspect="1"/>
+          </p:cNvSpPr>
+          <p:nvPr>
+            <p:ph type="sldImg" idx="2"/>
+          </p:nvPr>
+        </p:nvSpPr>
+        <p:spPr>
+          <a:xfrm>
+            <a:off x="381000" y="685800"/>
+            <a:ext cx="6096000" cy="3429000"/>
+          </a:xfrm>
+          <a:custGeom>
+            <a:avLst/>
+            <a:gdLst/>
+            <a:ahLst/>
+            <a:cxnLst/>
+            <a:rect l="0" t="0" r="0" b="0"/>
+            <a:pathLst>
+              <a:path w="120000" h="120000" extrusionOk="0">
+                <a:moveTo>
+                  <a:pt x="0" y="0"/>
+                </a:moveTo>
+                <a:lnTo>
+                  <a:pt x="120000" y="0"/>
+                </a:lnTo>
+                <a:lnTo>
+                  <a:pt x="120000" y="120000"/>
+                </a:lnTo>
+                <a:lnTo>
+                  <a:pt x="0" y="120000"/>
+                </a:lnTo>
+                <a:close/>
+              </a:path>
+            </a:pathLst>
+          </a:custGeom>
+        </p:spPr>
+      </p:sp>
+      <p:sp>
+        <p:nvSpPr>
+          <p:cNvPr id="256" name="Shape 256"/>
+          <p:cNvSpPr txBox="1">
+            <a:spLocks noGrp="1"/>
+          </p:cNvSpPr>
+          <p:nvPr>
+            <p:ph type="body" idx="1"/>
+          </p:nvPr>
+        </p:nvSpPr>
+        <p:spPr>
+          <a:xfrm>
+            <a:off x="685800" y="4343400"/>
+            <a:ext cx="5486400" cy="4114800"/>
+          </a:xfrm>
+          <a:prstGeom prst="rect">
+            <a:avLst/>
+          </a:prstGeom>
+        </p:spPr>
+        <p:txBody>
+          <a:bodyPr lIns="91425" tIns="91425" rIns="91425" bIns="91425" anchor="t" anchorCtr="0">
+            <a:noAutofit/>
+          </a:bodyPr>
+          <a:lstStyle/>
+          <a:p>
+            <a:pPr lvl="0">
+              <a:spcBef>
+                <a:spcPts val="0"/>
+              </a:spcBef>
+              <a:buNone/>
+            </a:pPr>
+            <a:endParaRPr/>
+          </a:p>
+        </p:txBody>
+      </p:sp>
+    </p:spTree>
+  </p:cSld>
+  <p:clrMapOvr>
+    <a:masterClrMapping/>
+  </p:clrMapOvr>
+</p:notes>
+</file>
+
+<file path=ppt/notesSlides/notesSlide16.xml><?xml version="1.0" encoding="utf-8"?>
+<p:notes xmlns:a="http://schemas.openxmlformats.org/drawingml/2006/main" xmlns:r="http://schemas.openxmlformats.org/officeDocument/2006/relationships" xmlns:p="http://schemas.openxmlformats.org/presentationml/2006/main" showMasterSp="0" showMasterPhAnim="0">
+  <p:cSld>
+    <p:spTree>
+      <p:nvGrpSpPr>
+        <p:cNvPr id="1" name="Shape 111"/>
+        <p:cNvGrpSpPr/>
+        <p:nvPr/>
+      </p:nvGrpSpPr>
+      <p:grpSpPr>
+        <a:xfrm>
+          <a:off x="0" y="0"/>
+          <a:ext cx="0" cy="0"/>
+          <a:chOff x="0" y="0"/>
+          <a:chExt cx="0" cy="0"/>
+        </a:xfrm>
+      </p:grpSpPr>
+      <p:sp>
+        <p:nvSpPr>
+          <p:cNvPr id="112" name="Shape 112"/>
+          <p:cNvSpPr>
+            <a:spLocks noGrp="1" noRot="1" noChangeAspect="1"/>
+          </p:cNvSpPr>
+          <p:nvPr>
+            <p:ph type="sldImg" idx="2"/>
+          </p:nvPr>
+        </p:nvSpPr>
+        <p:spPr>
+          <a:xfrm>
+            <a:off x="381000" y="685800"/>
+            <a:ext cx="6096000" cy="3429000"/>
+          </a:xfrm>
+          <a:custGeom>
+            <a:avLst/>
+            <a:gdLst/>
+            <a:ahLst/>
+            <a:cxnLst/>
+            <a:rect l="0" t="0" r="0" b="0"/>
+            <a:pathLst>
+              <a:path w="120000" h="120000" extrusionOk="0">
+                <a:moveTo>
+                  <a:pt x="0" y="0"/>
+                </a:moveTo>
+                <a:lnTo>
+                  <a:pt x="120000" y="0"/>
+                </a:lnTo>
+                <a:lnTo>
+                  <a:pt x="120000" y="120000"/>
+                </a:lnTo>
+                <a:lnTo>
+                  <a:pt x="0" y="120000"/>
+                </a:lnTo>
+                <a:close/>
+              </a:path>
+            </a:pathLst>
+          </a:custGeom>
+        </p:spPr>
+      </p:sp>
+      <p:sp>
+        <p:nvSpPr>
+          <p:cNvPr id="113" name="Shape 113"/>
+          <p:cNvSpPr txBox="1">
+            <a:spLocks noGrp="1"/>
+          </p:cNvSpPr>
+          <p:nvPr>
+            <p:ph type="body" idx="1"/>
+          </p:nvPr>
+        </p:nvSpPr>
+        <p:spPr>
+          <a:xfrm>
+            <a:off x="685800" y="4343400"/>
+            <a:ext cx="5486400" cy="4114800"/>
+          </a:xfrm>
+          <a:prstGeom prst="rect">
+            <a:avLst/>
+          </a:prstGeom>
+        </p:spPr>
+        <p:txBody>
+          <a:bodyPr lIns="91425" tIns="91425" rIns="91425" bIns="91425" anchor="t" anchorCtr="0">
+            <a:noAutofit/>
+          </a:bodyPr>
+          <a:lstStyle/>
+          <a:p>
+            <a:pPr lvl="0">
+              <a:spcBef>
+                <a:spcPts val="0"/>
+              </a:spcBef>
+              <a:buNone/>
+            </a:pPr>
+            <a:endParaRPr/>
+          </a:p>
+        </p:txBody>
+      </p:sp>
+    </p:spTree>
+  </p:cSld>
+  <p:clrMapOvr>
+    <a:masterClrMapping/>
+  </p:clrMapOvr>
+</p:notes>
+</file>
+
+<file path=ppt/notesSlides/notesSlide17.xml><?xml version="1.0" encoding="utf-8"?>
 <p:notes xmlns:a="http://schemas.openxmlformats.org/drawingml/2006/main" xmlns:r="http://schemas.openxmlformats.org/officeDocument/2006/relationships" xmlns:p="http://schemas.openxmlformats.org/presentationml/2006/main" showMasterSp="0" showMasterPhAnim="0">
   <p:cSld>
     <p:spTree>
@@ -5641,6 +5845,404 @@
       </p:grpSpPr>
       <p:sp>
         <p:nvSpPr>
+          <p:cNvPr id="80" name="Shape 80"/>
+          <p:cNvSpPr txBox="1">
+            <a:spLocks noGrp="1"/>
+          </p:cNvSpPr>
+          <p:nvPr>
+            <p:ph type="body" idx="1"/>
+          </p:nvPr>
+        </p:nvSpPr>
+        <p:spPr>
+          <a:xfrm>
+            <a:off x="311700" y="1389599"/>
+            <a:ext cx="2863478" cy="3403117"/>
+          </a:xfrm>
+          <a:prstGeom prst="rect">
+            <a:avLst/>
+          </a:prstGeom>
+        </p:spPr>
+        <p:txBody>
+          <a:bodyPr lIns="91425" tIns="91425" rIns="91425" bIns="91425" anchor="t" anchorCtr="0">
+            <a:noAutofit/>
+          </a:bodyPr>
+          <a:lstStyle/>
+          <a:p>
+            <a:pPr lvl="0">
+              <a:spcBef>
+                <a:spcPts val="0"/>
+              </a:spcBef>
+              <a:buNone/>
+            </a:pPr>
+            <a:r>
+              <a:rPr lang="en-US" sz="1800" dirty="0" err="1" smtClean="0"/>
+              <a:t>ViewPager</a:t>
+            </a:r>
+            <a:r>
+              <a:rPr lang="en-US" sz="1800" dirty="0" smtClean="0"/>
+              <a:t> + </a:t>
+            </a:r>
+            <a:r>
+              <a:rPr lang="en-US" sz="1800" dirty="0" err="1" smtClean="0"/>
+              <a:t>TabLayout</a:t>
+            </a:r>
+            <a:endParaRPr lang="en-US" sz="1800" dirty="0" smtClean="0"/>
+          </a:p>
+          <a:p>
+            <a:pPr lvl="0">
+              <a:spcBef>
+                <a:spcPts val="0"/>
+              </a:spcBef>
+              <a:buNone/>
+            </a:pPr>
+            <a:r>
+              <a:rPr lang="en-US" sz="1800" dirty="0" smtClean="0"/>
+              <a:t>Switch detail options :(select tab, swipe detail)</a:t>
+            </a:r>
+          </a:p>
+          <a:p>
+            <a:pPr lvl="0">
+              <a:spcBef>
+                <a:spcPts val="0"/>
+              </a:spcBef>
+              <a:buNone/>
+            </a:pPr>
+            <a:r>
+              <a:rPr lang="en-US" sz="1800" dirty="0" smtClean="0"/>
+              <a:t>Data call starts when tab is viewed</a:t>
+            </a:r>
+          </a:p>
+        </p:txBody>
+      </p:sp>
+      <p:sp>
+        <p:nvSpPr>
+          <p:cNvPr id="3" name="Title 2"/>
+          <p:cNvSpPr>
+            <a:spLocks noGrp="1"/>
+          </p:cNvSpPr>
+          <p:nvPr>
+            <p:ph type="title"/>
+          </p:nvPr>
+        </p:nvSpPr>
+        <p:spPr>
+          <a:xfrm>
+            <a:off x="311699" y="555600"/>
+            <a:ext cx="2863479" cy="755700"/>
+          </a:xfrm>
+        </p:spPr>
+        <p:txBody>
+          <a:bodyPr/>
+          <a:lstStyle/>
+          <a:p>
+            <a:r>
+              <a:rPr lang="en-US" dirty="0" smtClean="0"/>
+              <a:t>Weather Detail Tab Navigation</a:t>
+            </a:r>
+            <a:endParaRPr lang="en-US" dirty="0"/>
+          </a:p>
+        </p:txBody>
+      </p:sp>
+      <p:pic>
+        <p:nvPicPr>
+          <p:cNvPr id="2" name="Picture 1" descr="Screenshot_20160424-125539.png"/>
+          <p:cNvPicPr>
+            <a:picLocks noChangeAspect="1"/>
+          </p:cNvPicPr>
+          <p:nvPr/>
+        </p:nvPicPr>
+        <p:blipFill>
+          <a:blip r:embed="rId3">
+            <a:extLst>
+              <a:ext uri="{28A0092B-C50C-407E-A947-70E740481C1C}">
+                <a14:useLocalDpi xmlns:a14="http://schemas.microsoft.com/office/drawing/2010/main" val="0"/>
+              </a:ext>
+            </a:extLst>
+          </a:blip>
+          <a:stretch>
+            <a:fillRect/>
+          </a:stretch>
+        </p:blipFill>
+        <p:spPr>
+          <a:xfrm>
+            <a:off x="3482688" y="204817"/>
+            <a:ext cx="2580693" cy="4587899"/>
+          </a:xfrm>
+          <a:prstGeom prst="rect">
+            <a:avLst/>
+          </a:prstGeom>
+        </p:spPr>
+      </p:pic>
+      <p:pic>
+        <p:nvPicPr>
+          <p:cNvPr id="5" name="Picture 4" descr="Screenshot_20160424-125542.png"/>
+          <p:cNvPicPr>
+            <a:picLocks noChangeAspect="1"/>
+          </p:cNvPicPr>
+          <p:nvPr/>
+        </p:nvPicPr>
+        <p:blipFill>
+          <a:blip r:embed="rId4">
+            <a:extLst>
+              <a:ext uri="{28A0092B-C50C-407E-A947-70E740481C1C}">
+                <a14:useLocalDpi xmlns:a14="http://schemas.microsoft.com/office/drawing/2010/main" val="0"/>
+              </a:ext>
+            </a:extLst>
+          </a:blip>
+          <a:stretch>
+            <a:fillRect/>
+          </a:stretch>
+        </p:blipFill>
+        <p:spPr>
+          <a:xfrm>
+            <a:off x="6207196" y="204817"/>
+            <a:ext cx="2580694" cy="4587900"/>
+          </a:xfrm>
+          <a:prstGeom prst="rect">
+            <a:avLst/>
+          </a:prstGeom>
+        </p:spPr>
+      </p:pic>
+    </p:spTree>
+    <p:extLst>
+      <p:ext uri="{BB962C8B-B14F-4D97-AF65-F5344CB8AC3E}">
+        <p14:creationId xmlns:p14="http://schemas.microsoft.com/office/powerpoint/2010/main" val="3939256472"/>
+      </p:ext>
+    </p:extLst>
+  </p:cSld>
+  <p:clrMapOvr>
+    <a:masterClrMapping/>
+  </p:clrMapOvr>
+  <p:transition xmlns:p14="http://schemas.microsoft.com/office/powerpoint/2010/main" spd="slow">
+    <p:cut/>
+  </p:transition>
+  <p:timing>
+    <p:tnLst>
+      <p:par>
+        <p:cTn xmlns:p14="http://schemas.microsoft.com/office/powerpoint/2010/main" id="1" dur="indefinite" restart="never" nodeType="tmRoot"/>
+      </p:par>
+    </p:tnLst>
+  </p:timing>
+</p:sld>
+</file>
+
+<file path=ppt/slides/slide11.xml><?xml version="1.0" encoding="utf-8"?>
+<p:sld xmlns:a="http://schemas.openxmlformats.org/drawingml/2006/main" xmlns:r="http://schemas.openxmlformats.org/officeDocument/2006/relationships" xmlns:p="http://schemas.openxmlformats.org/presentationml/2006/main">
+  <p:cSld>
+    <p:spTree>
+      <p:nvGrpSpPr>
+        <p:cNvPr id="1" name="Shape 78"/>
+        <p:cNvGrpSpPr/>
+        <p:nvPr/>
+      </p:nvGrpSpPr>
+      <p:grpSpPr>
+        <a:xfrm>
+          <a:off x="0" y="0"/>
+          <a:ext cx="0" cy="0"/>
+          <a:chOff x="0" y="0"/>
+          <a:chExt cx="0" cy="0"/>
+        </a:xfrm>
+      </p:grpSpPr>
+      <p:sp>
+        <p:nvSpPr>
+          <p:cNvPr id="80" name="Shape 80"/>
+          <p:cNvSpPr txBox="1">
+            <a:spLocks noGrp="1"/>
+          </p:cNvSpPr>
+          <p:nvPr>
+            <p:ph type="body" idx="1"/>
+          </p:nvPr>
+        </p:nvSpPr>
+        <p:spPr>
+          <a:xfrm>
+            <a:off x="311700" y="1389599"/>
+            <a:ext cx="2863478" cy="3403117"/>
+          </a:xfrm>
+          <a:prstGeom prst="rect">
+            <a:avLst/>
+          </a:prstGeom>
+        </p:spPr>
+        <p:txBody>
+          <a:bodyPr lIns="91425" tIns="91425" rIns="91425" bIns="91425" anchor="t" anchorCtr="0">
+            <a:noAutofit/>
+          </a:bodyPr>
+          <a:lstStyle/>
+          <a:p>
+            <a:pPr lvl="0">
+              <a:spcBef>
+                <a:spcPts val="0"/>
+              </a:spcBef>
+              <a:buNone/>
+            </a:pPr>
+            <a:r>
+              <a:rPr lang="en-US" sz="1800" dirty="0" err="1" smtClean="0"/>
+              <a:t>ViewPager</a:t>
+            </a:r>
+            <a:r>
+              <a:rPr lang="en-US" sz="1800" dirty="0" smtClean="0"/>
+              <a:t> + </a:t>
+            </a:r>
+            <a:r>
+              <a:rPr lang="en-US" sz="1800" dirty="0" err="1" smtClean="0"/>
+              <a:t>TabLayout</a:t>
+            </a:r>
+            <a:endParaRPr lang="en-US" sz="1800" dirty="0" smtClean="0"/>
+          </a:p>
+          <a:p>
+            <a:pPr lvl="0">
+              <a:spcBef>
+                <a:spcPts val="0"/>
+              </a:spcBef>
+              <a:buNone/>
+            </a:pPr>
+            <a:r>
+              <a:rPr lang="en-US" sz="1800" dirty="0" smtClean="0"/>
+              <a:t>Switch detail options :(select tab, swipe detail)</a:t>
+            </a:r>
+          </a:p>
+          <a:p>
+            <a:pPr lvl="0">
+              <a:spcBef>
+                <a:spcPts val="0"/>
+              </a:spcBef>
+              <a:buNone/>
+            </a:pPr>
+            <a:r>
+              <a:rPr lang="en-US" sz="1800" dirty="0" smtClean="0"/>
+              <a:t>Data call starts when tab is viewed</a:t>
+            </a:r>
+          </a:p>
+        </p:txBody>
+      </p:sp>
+      <p:sp>
+        <p:nvSpPr>
+          <p:cNvPr id="3" name="Title 2"/>
+          <p:cNvSpPr>
+            <a:spLocks noGrp="1"/>
+          </p:cNvSpPr>
+          <p:nvPr>
+            <p:ph type="title"/>
+          </p:nvPr>
+        </p:nvSpPr>
+        <p:spPr>
+          <a:xfrm>
+            <a:off x="311699" y="555600"/>
+            <a:ext cx="2863479" cy="755700"/>
+          </a:xfrm>
+        </p:spPr>
+        <p:txBody>
+          <a:bodyPr/>
+          <a:lstStyle/>
+          <a:p>
+            <a:r>
+              <a:rPr lang="en-US" dirty="0" smtClean="0"/>
+              <a:t>Sharing Weather Data</a:t>
+            </a:r>
+            <a:endParaRPr lang="en-US" dirty="0"/>
+          </a:p>
+        </p:txBody>
+      </p:sp>
+      <p:pic>
+        <p:nvPicPr>
+          <p:cNvPr id="2" name="Picture 1" descr="Screenshot_20160424-125539.png"/>
+          <p:cNvPicPr>
+            <a:picLocks noChangeAspect="1"/>
+          </p:cNvPicPr>
+          <p:nvPr/>
+        </p:nvPicPr>
+        <p:blipFill>
+          <a:blip r:embed="rId3">
+            <a:extLst>
+              <a:ext uri="{28A0092B-C50C-407E-A947-70E740481C1C}">
+                <a14:useLocalDpi xmlns:a14="http://schemas.microsoft.com/office/drawing/2010/main" val="0"/>
+              </a:ext>
+            </a:extLst>
+          </a:blip>
+          <a:stretch>
+            <a:fillRect/>
+          </a:stretch>
+        </p:blipFill>
+        <p:spPr>
+          <a:xfrm>
+            <a:off x="3482688" y="204817"/>
+            <a:ext cx="2580693" cy="4587899"/>
+          </a:xfrm>
+          <a:prstGeom prst="rect">
+            <a:avLst/>
+          </a:prstGeom>
+        </p:spPr>
+      </p:pic>
+      <p:pic>
+        <p:nvPicPr>
+          <p:cNvPr id="5" name="Picture 4" descr="Screenshot_20160424-125542.png"/>
+          <p:cNvPicPr>
+            <a:picLocks noChangeAspect="1"/>
+          </p:cNvPicPr>
+          <p:nvPr/>
+        </p:nvPicPr>
+        <p:blipFill>
+          <a:blip r:embed="rId4">
+            <a:extLst>
+              <a:ext uri="{28A0092B-C50C-407E-A947-70E740481C1C}">
+                <a14:useLocalDpi xmlns:a14="http://schemas.microsoft.com/office/drawing/2010/main" val="0"/>
+              </a:ext>
+            </a:extLst>
+          </a:blip>
+          <a:stretch>
+            <a:fillRect/>
+          </a:stretch>
+        </p:blipFill>
+        <p:spPr>
+          <a:xfrm>
+            <a:off x="6207196" y="204817"/>
+            <a:ext cx="2580694" cy="4587900"/>
+          </a:xfrm>
+          <a:prstGeom prst="rect">
+            <a:avLst/>
+          </a:prstGeom>
+        </p:spPr>
+      </p:pic>
+    </p:spTree>
+    <p:extLst>
+      <p:ext uri="{BB962C8B-B14F-4D97-AF65-F5344CB8AC3E}">
+        <p14:creationId xmlns:p14="http://schemas.microsoft.com/office/powerpoint/2010/main" val="1847522356"/>
+      </p:ext>
+    </p:extLst>
+  </p:cSld>
+  <p:clrMapOvr>
+    <a:masterClrMapping/>
+  </p:clrMapOvr>
+  <p:transition xmlns:p14="http://schemas.microsoft.com/office/powerpoint/2010/main" spd="slow">
+    <p:cut/>
+  </p:transition>
+  <p:timing>
+    <p:tnLst>
+      <p:par>
+        <p:cTn xmlns:p14="http://schemas.microsoft.com/office/powerpoint/2010/main" id="1" dur="indefinite" restart="never" nodeType="tmRoot"/>
+      </p:par>
+    </p:tnLst>
+  </p:timing>
+</p:sld>
+</file>
+
+<file path=ppt/slides/slide12.xml><?xml version="1.0" encoding="utf-8"?>
+<p:sld xmlns:a="http://schemas.openxmlformats.org/drawingml/2006/main" xmlns:r="http://schemas.openxmlformats.org/officeDocument/2006/relationships" xmlns:p="http://schemas.openxmlformats.org/presentationml/2006/main">
+  <p:cSld>
+    <p:spTree>
+      <p:nvGrpSpPr>
+        <p:cNvPr id="1" name="Shape 78"/>
+        <p:cNvGrpSpPr/>
+        <p:nvPr/>
+      </p:nvGrpSpPr>
+      <p:grpSpPr>
+        <a:xfrm>
+          <a:off x="0" y="0"/>
+          <a:ext cx="0" cy="0"/>
+          <a:chOff x="0" y="0"/>
+          <a:chExt cx="0" cy="0"/>
+        </a:xfrm>
+      </p:grpSpPr>
+      <p:sp>
+        <p:nvSpPr>
           <p:cNvPr id="79" name="Shape 79"/>
           <p:cNvSpPr txBox="1">
             <a:spLocks noGrp="1"/>
@@ -5836,7 +6438,7 @@
 </p:sld>
 </file>
 
-<file path=ppt/slides/slide11.xml><?xml version="1.0" encoding="utf-8"?>
+<file path=ppt/slides/slide13.xml><?xml version="1.0" encoding="utf-8"?>
 <p:sld xmlns:a="http://schemas.openxmlformats.org/drawingml/2006/main" xmlns:r="http://schemas.openxmlformats.org/officeDocument/2006/relationships" xmlns:p="http://schemas.openxmlformats.org/presentationml/2006/main">
   <p:cSld>
     <p:spTree>
@@ -5989,158 +6591,6 @@
     <p:extLst>
       <p:ext uri="{BB962C8B-B14F-4D97-AF65-F5344CB8AC3E}">
         <p14:creationId xmlns:p14="http://schemas.microsoft.com/office/powerpoint/2010/main" val="3619969681"/>
-      </p:ext>
-    </p:extLst>
-  </p:cSld>
-  <p:clrMapOvr>
-    <a:masterClrMapping/>
-  </p:clrMapOvr>
-  <p:transition xmlns:p14="http://schemas.microsoft.com/office/powerpoint/2010/main" spd="slow">
-    <p:cut/>
-  </p:transition>
-  <p:timing>
-    <p:tnLst>
-      <p:par>
-        <p:cTn xmlns:p14="http://schemas.microsoft.com/office/powerpoint/2010/main" id="1" dur="indefinite" restart="never" nodeType="tmRoot"/>
-      </p:par>
-    </p:tnLst>
-  </p:timing>
-</p:sld>
-</file>
-
-<file path=ppt/slides/slide12.xml><?xml version="1.0" encoding="utf-8"?>
-<p:sld xmlns:a="http://schemas.openxmlformats.org/drawingml/2006/main" xmlns:r="http://schemas.openxmlformats.org/officeDocument/2006/relationships" xmlns:p="http://schemas.openxmlformats.org/presentationml/2006/main">
-  <p:cSld>
-    <p:spTree>
-      <p:nvGrpSpPr>
-        <p:cNvPr id="1" name="Shape 257"/>
-        <p:cNvGrpSpPr/>
-        <p:nvPr/>
-      </p:nvGrpSpPr>
-      <p:grpSpPr>
-        <a:xfrm>
-          <a:off x="0" y="0"/>
-          <a:ext cx="0" cy="0"/>
-          <a:chOff x="0" y="0"/>
-          <a:chExt cx="0" cy="0"/>
-        </a:xfrm>
-      </p:grpSpPr>
-      <p:sp>
-        <p:nvSpPr>
-          <p:cNvPr id="258" name="Shape 258"/>
-          <p:cNvSpPr txBox="1">
-            <a:spLocks noGrp="1"/>
-          </p:cNvSpPr>
-          <p:nvPr>
-            <p:ph type="title"/>
-          </p:nvPr>
-        </p:nvSpPr>
-        <p:spPr>
-          <a:xfrm>
-            <a:off x="671250" y="2141250"/>
-            <a:ext cx="7852200" cy="861000"/>
-          </a:xfrm>
-          <a:prstGeom prst="rect">
-            <a:avLst/>
-          </a:prstGeom>
-        </p:spPr>
-        <p:txBody>
-          <a:bodyPr lIns="91425" tIns="91425" rIns="91425" bIns="91425" anchor="ctr" anchorCtr="0">
-            <a:noAutofit/>
-          </a:bodyPr>
-          <a:lstStyle/>
-          <a:p>
-            <a:pPr lvl="0">
-              <a:spcBef>
-                <a:spcPts val="0"/>
-              </a:spcBef>
-              <a:buNone/>
-            </a:pPr>
-            <a:r>
-              <a:rPr lang="en"/>
-              <a:t>DEMO</a:t>
-            </a:r>
-          </a:p>
-        </p:txBody>
-      </p:sp>
-    </p:spTree>
-  </p:cSld>
-  <p:clrMapOvr>
-    <a:masterClrMapping/>
-  </p:clrMapOvr>
-  <p:transition xmlns:p14="http://schemas.microsoft.com/office/powerpoint/2010/main" spd="slow">
-    <p:cut/>
-  </p:transition>
-  <p:timing>
-    <p:tnLst>
-      <p:par>
-        <p:cTn xmlns:p14="http://schemas.microsoft.com/office/powerpoint/2010/main" id="1" dur="indefinite" restart="never" nodeType="tmRoot"/>
-      </p:par>
-    </p:tnLst>
-  </p:timing>
-</p:sld>
-</file>
-
-<file path=ppt/slides/slide13.xml><?xml version="1.0" encoding="utf-8"?>
-<p:sld xmlns:a="http://schemas.openxmlformats.org/drawingml/2006/main" xmlns:r="http://schemas.openxmlformats.org/officeDocument/2006/relationships" xmlns:p="http://schemas.openxmlformats.org/presentationml/2006/main">
-  <p:cSld>
-    <p:spTree>
-      <p:nvGrpSpPr>
-        <p:cNvPr id="1" name="Shape 257"/>
-        <p:cNvGrpSpPr/>
-        <p:nvPr/>
-      </p:nvGrpSpPr>
-      <p:grpSpPr>
-        <a:xfrm>
-          <a:off x="0" y="0"/>
-          <a:ext cx="0" cy="0"/>
-          <a:chOff x="0" y="0"/>
-          <a:chExt cx="0" cy="0"/>
-        </a:xfrm>
-      </p:grpSpPr>
-      <p:sp>
-        <p:nvSpPr>
-          <p:cNvPr id="258" name="Shape 258"/>
-          <p:cNvSpPr txBox="1">
-            <a:spLocks noGrp="1"/>
-          </p:cNvSpPr>
-          <p:nvPr>
-            <p:ph type="title"/>
-          </p:nvPr>
-        </p:nvSpPr>
-        <p:spPr>
-          <a:xfrm>
-            <a:off x="671250" y="2141250"/>
-            <a:ext cx="7852200" cy="861000"/>
-          </a:xfrm>
-          <a:prstGeom prst="rect">
-            <a:avLst/>
-          </a:prstGeom>
-        </p:spPr>
-        <p:txBody>
-          <a:bodyPr lIns="91425" tIns="91425" rIns="91425" bIns="91425" anchor="ctr" anchorCtr="0">
-            <a:noAutofit/>
-          </a:bodyPr>
-          <a:lstStyle/>
-          <a:p>
-            <a:pPr lvl="0">
-              <a:spcBef>
-                <a:spcPts val="0"/>
-              </a:spcBef>
-              <a:buNone/>
-            </a:pPr>
-            <a:r>
-              <a:rPr lang="en-US" dirty="0" smtClean="0"/>
-              <a:t>Code Walkthrough</a:t>
-            </a:r>
-            <a:endParaRPr lang="en" dirty="0"/>
-          </a:p>
-        </p:txBody>
-      </p:sp>
-    </p:spTree>
-    <p:extLst>
-      <p:ext uri="{BB962C8B-B14F-4D97-AF65-F5344CB8AC3E}">
-        <p14:creationId xmlns:p14="http://schemas.microsoft.com/office/powerpoint/2010/main" val="3214651728"/>
       </p:ext>
     </p:extLst>
   </p:cSld>
@@ -6165,6 +6615,158 @@
   <p:cSld>
     <p:spTree>
       <p:nvGrpSpPr>
+        <p:cNvPr id="1" name="Shape 257"/>
+        <p:cNvGrpSpPr/>
+        <p:nvPr/>
+      </p:nvGrpSpPr>
+      <p:grpSpPr>
+        <a:xfrm>
+          <a:off x="0" y="0"/>
+          <a:ext cx="0" cy="0"/>
+          <a:chOff x="0" y="0"/>
+          <a:chExt cx="0" cy="0"/>
+        </a:xfrm>
+      </p:grpSpPr>
+      <p:sp>
+        <p:nvSpPr>
+          <p:cNvPr id="258" name="Shape 258"/>
+          <p:cNvSpPr txBox="1">
+            <a:spLocks noGrp="1"/>
+          </p:cNvSpPr>
+          <p:nvPr>
+            <p:ph type="title"/>
+          </p:nvPr>
+        </p:nvSpPr>
+        <p:spPr>
+          <a:xfrm>
+            <a:off x="671250" y="2141250"/>
+            <a:ext cx="7852200" cy="861000"/>
+          </a:xfrm>
+          <a:prstGeom prst="rect">
+            <a:avLst/>
+          </a:prstGeom>
+        </p:spPr>
+        <p:txBody>
+          <a:bodyPr lIns="91425" tIns="91425" rIns="91425" bIns="91425" anchor="ctr" anchorCtr="0">
+            <a:noAutofit/>
+          </a:bodyPr>
+          <a:lstStyle/>
+          <a:p>
+            <a:pPr lvl="0">
+              <a:spcBef>
+                <a:spcPts val="0"/>
+              </a:spcBef>
+              <a:buNone/>
+            </a:pPr>
+            <a:r>
+              <a:rPr lang="en"/>
+              <a:t>DEMO</a:t>
+            </a:r>
+          </a:p>
+        </p:txBody>
+      </p:sp>
+    </p:spTree>
+  </p:cSld>
+  <p:clrMapOvr>
+    <a:masterClrMapping/>
+  </p:clrMapOvr>
+  <p:transition xmlns:p14="http://schemas.microsoft.com/office/powerpoint/2010/main" spd="slow">
+    <p:cut/>
+  </p:transition>
+  <p:timing>
+    <p:tnLst>
+      <p:par>
+        <p:cTn xmlns:p14="http://schemas.microsoft.com/office/powerpoint/2010/main" id="1" dur="indefinite" restart="never" nodeType="tmRoot"/>
+      </p:par>
+    </p:tnLst>
+  </p:timing>
+</p:sld>
+</file>
+
+<file path=ppt/slides/slide15.xml><?xml version="1.0" encoding="utf-8"?>
+<p:sld xmlns:a="http://schemas.openxmlformats.org/drawingml/2006/main" xmlns:r="http://schemas.openxmlformats.org/officeDocument/2006/relationships" xmlns:p="http://schemas.openxmlformats.org/presentationml/2006/main">
+  <p:cSld>
+    <p:spTree>
+      <p:nvGrpSpPr>
+        <p:cNvPr id="1" name="Shape 257"/>
+        <p:cNvGrpSpPr/>
+        <p:nvPr/>
+      </p:nvGrpSpPr>
+      <p:grpSpPr>
+        <a:xfrm>
+          <a:off x="0" y="0"/>
+          <a:ext cx="0" cy="0"/>
+          <a:chOff x="0" y="0"/>
+          <a:chExt cx="0" cy="0"/>
+        </a:xfrm>
+      </p:grpSpPr>
+      <p:sp>
+        <p:nvSpPr>
+          <p:cNvPr id="258" name="Shape 258"/>
+          <p:cNvSpPr txBox="1">
+            <a:spLocks noGrp="1"/>
+          </p:cNvSpPr>
+          <p:nvPr>
+            <p:ph type="title"/>
+          </p:nvPr>
+        </p:nvSpPr>
+        <p:spPr>
+          <a:xfrm>
+            <a:off x="671250" y="2141250"/>
+            <a:ext cx="7852200" cy="861000"/>
+          </a:xfrm>
+          <a:prstGeom prst="rect">
+            <a:avLst/>
+          </a:prstGeom>
+        </p:spPr>
+        <p:txBody>
+          <a:bodyPr lIns="91425" tIns="91425" rIns="91425" bIns="91425" anchor="ctr" anchorCtr="0">
+            <a:noAutofit/>
+          </a:bodyPr>
+          <a:lstStyle/>
+          <a:p>
+            <a:pPr lvl="0">
+              <a:spcBef>
+                <a:spcPts val="0"/>
+              </a:spcBef>
+              <a:buNone/>
+            </a:pPr>
+            <a:r>
+              <a:rPr lang="en-US" dirty="0" smtClean="0"/>
+              <a:t>Code Walkthrough</a:t>
+            </a:r>
+            <a:endParaRPr lang="en" dirty="0"/>
+          </a:p>
+        </p:txBody>
+      </p:sp>
+    </p:spTree>
+    <p:extLst>
+      <p:ext uri="{BB962C8B-B14F-4D97-AF65-F5344CB8AC3E}">
+        <p14:creationId xmlns:p14="http://schemas.microsoft.com/office/powerpoint/2010/main" val="3214651728"/>
+      </p:ext>
+    </p:extLst>
+  </p:cSld>
+  <p:clrMapOvr>
+    <a:masterClrMapping/>
+  </p:clrMapOvr>
+  <p:transition xmlns:p14="http://schemas.microsoft.com/office/powerpoint/2010/main" spd="slow">
+    <p:cut/>
+  </p:transition>
+  <p:timing>
+    <p:tnLst>
+      <p:par>
+        <p:cTn xmlns:p14="http://schemas.microsoft.com/office/powerpoint/2010/main" id="1" dur="indefinite" restart="never" nodeType="tmRoot"/>
+      </p:par>
+    </p:tnLst>
+  </p:timing>
+</p:sld>
+</file>
+
+<file path=ppt/slides/slide16.xml><?xml version="1.0" encoding="utf-8"?>
+<p:sld xmlns:a="http://schemas.openxmlformats.org/drawingml/2006/main" xmlns:r="http://schemas.openxmlformats.org/officeDocument/2006/relationships" xmlns:p="http://schemas.openxmlformats.org/presentationml/2006/main">
+  <p:cSld>
+    <p:spTree>
+      <p:nvGrpSpPr>
         <p:cNvPr id="1" name="Shape 114"/>
         <p:cNvGrpSpPr/>
         <p:nvPr/>
@@ -6397,7 +6999,7 @@
 </p:sld>
 </file>
 
-<file path=ppt/slides/slide15.xml><?xml version="1.0" encoding="utf-8"?>
+<file path=ppt/slides/slide17.xml><?xml version="1.0" encoding="utf-8"?>
 <p:sld xmlns:a="http://schemas.openxmlformats.org/drawingml/2006/main" xmlns:r="http://schemas.openxmlformats.org/officeDocument/2006/relationships" xmlns:p="http://schemas.openxmlformats.org/presentationml/2006/main">
   <p:cSld>
     <p:spTree>
@@ -6836,8 +7438,8 @@
         </p:nvSpPr>
         <p:spPr>
           <a:xfrm>
-            <a:off x="311700" y="1389600"/>
-            <a:ext cx="4358884" cy="3179400"/>
+            <a:off x="311700" y="1389599"/>
+            <a:ext cx="3467786" cy="3403117"/>
           </a:xfrm>
           <a:prstGeom prst="rect">
             <a:avLst/>
@@ -6857,8 +7459,13 @@
             </a:pPr>
             <a:r>
               <a:rPr lang="en-US" sz="1800" dirty="0" smtClean="0"/>
-              <a:t>Cached weather data</a:t>
-            </a:r>
+              <a:t>Cached </a:t>
+            </a:r>
+            <a:r>
+              <a:rPr lang="en-US" sz="1800" dirty="0" smtClean="0"/>
+              <a:t>weather data</a:t>
+            </a:r>
+            <a:endParaRPr lang="en-US" sz="1800" dirty="0" smtClean="0"/>
           </a:p>
           <a:p>
             <a:pPr lvl="0">
@@ -6869,8 +7476,9 @@
             </a:pPr>
             <a:r>
               <a:rPr lang="en-US" sz="1800" dirty="0" smtClean="0"/>
-              <a:t>Eviction after 1 minute (for demo)</a:t>
-            </a:r>
+              <a:t>Eviction after 1 minute</a:t>
+            </a:r>
+            <a:endParaRPr lang="en-US" sz="1800" dirty="0" smtClean="0"/>
           </a:p>
           <a:p>
             <a:pPr lvl="0">
@@ -6905,8 +7513,9 @@
             </a:pPr>
             <a:r>
               <a:rPr lang="en-US" sz="1800" dirty="0" smtClean="0"/>
-              <a:t>Button to open location in maps app</a:t>
-            </a:r>
+              <a:t>Open location Button</a:t>
+            </a:r>
+            <a:endParaRPr lang="en-US" sz="1800" dirty="0" smtClean="0"/>
           </a:p>
           <a:p>
             <a:pPr lvl="0">
@@ -6917,7 +7526,11 @@
             </a:pPr>
             <a:r>
               <a:rPr lang="en-US" sz="1800" dirty="0" smtClean="0"/>
-              <a:t>Weather API logo (API requirement)</a:t>
+              <a:t>Weather API </a:t>
+            </a:r>
+            <a:r>
+              <a:rPr lang="en-US" sz="1800" dirty="0" smtClean="0"/>
+              <a:t>logo</a:t>
             </a:r>
             <a:endParaRPr lang="en-US" sz="1800" dirty="0"/>
           </a:p>
@@ -6945,7 +7558,7 @@
           <a:p>
             <a:r>
               <a:rPr lang="en-US" dirty="0" smtClean="0"/>
-              <a:t>Current Weather Detail</a:t>
+              <a:t>Weather Detail</a:t>
             </a:r>
             <a:endParaRPr lang="en-US" dirty="0"/>
           </a:p>
@@ -6953,7 +7566,7 @@
       </p:sp>
       <p:pic>
         <p:nvPicPr>
-          <p:cNvPr id="4" name="Picture 3" descr="Current_Weather.png"/>
+          <p:cNvPr id="2" name="Picture 1" descr="Screenshot_20160424-125539.png"/>
           <p:cNvPicPr>
             <a:picLocks noChangeAspect="1"/>
           </p:cNvPicPr>
@@ -6973,8 +7586,38 @@
         </p:blipFill>
         <p:spPr>
           <a:xfrm>
-            <a:off x="5418287" y="204818"/>
-            <a:ext cx="2662798" cy="4733863"/>
+            <a:off x="3482688" y="204817"/>
+            <a:ext cx="2580693" cy="4587899"/>
+          </a:xfrm>
+          <a:prstGeom prst="rect">
+            <a:avLst/>
+          </a:prstGeom>
+        </p:spPr>
+      </p:pic>
+      <p:pic>
+        <p:nvPicPr>
+          <p:cNvPr id="5" name="Picture 4" descr="Screenshot_20160424-125542.png"/>
+          <p:cNvPicPr>
+            <a:picLocks noChangeAspect="1"/>
+          </p:cNvPicPr>
+          <p:nvPr/>
+        </p:nvPicPr>
+        <p:blipFill>
+          <a:blip r:embed="rId4">
+            <a:extLst>
+              <a:ext uri="{28A0092B-C50C-407E-A947-70E740481C1C}">
+                <a14:useLocalDpi xmlns:a14="http://schemas.microsoft.com/office/drawing/2010/main" val="0"/>
+              </a:ext>
+            </a:extLst>
+          </a:blip>
+          <a:stretch>
+            <a:fillRect/>
+          </a:stretch>
+        </p:blipFill>
+        <p:spPr>
+          <a:xfrm>
+            <a:off x="6207196" y="204817"/>
+            <a:ext cx="2580694" cy="4587900"/>
           </a:xfrm>
           <a:prstGeom prst="rect">
             <a:avLst/>
@@ -7157,8 +7800,8 @@
         </p:blipFill>
         <p:spPr>
           <a:xfrm>
-            <a:off x="3339294" y="199725"/>
-            <a:ext cx="2662798" cy="4733863"/>
+            <a:off x="3558708" y="281652"/>
+            <a:ext cx="2566294" cy="4562301"/>
           </a:xfrm>
           <a:prstGeom prst="rect">
             <a:avLst/>
@@ -7187,8 +7830,8 @@
         </p:blipFill>
         <p:spPr>
           <a:xfrm>
-            <a:off x="6084032" y="199725"/>
-            <a:ext cx="2665662" cy="4738955"/>
+            <a:off x="6258154" y="281652"/>
+            <a:ext cx="2566294" cy="4562301"/>
           </a:xfrm>
           <a:prstGeom prst="rect">
             <a:avLst/>
@@ -7388,7 +8031,7 @@
       </p:pic>
       <p:pic>
         <p:nvPicPr>
-          <p:cNvPr id="9" name="Picture 8" descr="Screenshot_20160422-223033.png"/>
+          <p:cNvPr id="2" name="Picture 1" descr="Screenshot_20160424-131100.png"/>
           <p:cNvPicPr>
             <a:picLocks noChangeAspect="1"/>
           </p:cNvPicPr>
@@ -7408,8 +8051,8 @@
         </p:blipFill>
         <p:spPr>
           <a:xfrm>
-            <a:off x="6295841" y="411935"/>
-            <a:ext cx="2372030" cy="4216941"/>
+            <a:off x="6305165" y="399180"/>
+            <a:ext cx="2372029" cy="4216940"/>
           </a:xfrm>
           <a:prstGeom prst="rect">
             <a:avLst/>
@@ -7699,30 +8342,40 @@
             </a:pPr>
             <a:r>
               <a:rPr lang="en-US" dirty="0" smtClean="0"/>
-              <a:t>Current Forecast to 3 Day Forecast Tabs / Swipe</a:t>
-            </a:r>
-          </a:p>
-          <a:p>
-            <a:pPr marL="457200" lvl="0" indent="-228600" rtl="0">
-              <a:spcBef>
-                <a:spcPts val="0"/>
-              </a:spcBef>
-            </a:pPr>
+              <a:t>Weather Detail Tab Navigation</a:t>
+            </a:r>
+            <a:endParaRPr lang="en-US" dirty="0" smtClean="0"/>
+          </a:p>
+          <a:p>
+            <a:pPr marL="457200" lvl="0" indent="-228600"/>
             <a:r>
               <a:rPr lang="en-US" dirty="0" smtClean="0"/>
-              <a:t>Phunware Icon and Splash Screen</a:t>
-            </a:r>
-          </a:p>
-          <a:p>
-            <a:pPr marL="457200" lvl="0" indent="-228600" rtl="0">
-              <a:spcBef>
-                <a:spcPts val="0"/>
-              </a:spcBef>
-            </a:pPr>
+              <a:t>Sharing </a:t>
+            </a:r>
             <a:r>
               <a:rPr lang="en-US" dirty="0" smtClean="0"/>
-              <a:t>Sharing Weather Information</a:t>
-            </a:r>
+              <a:t>Weather </a:t>
+            </a:r>
+            <a:r>
+              <a:rPr lang="en-US" smtClean="0"/>
+              <a:t>Data </a:t>
+            </a:r>
+          </a:p>
+          <a:p>
+            <a:pPr marL="457200" lvl="0" indent="-228600"/>
+            <a:r>
+              <a:rPr lang="en-US" smtClean="0"/>
+              <a:t>Phunware </a:t>
+            </a:r>
+            <a:r>
+              <a:rPr lang="en-US" dirty="0"/>
+              <a:t>Icon and Splash </a:t>
+            </a:r>
+            <a:r>
+              <a:rPr lang="en-US" dirty="0" smtClean="0"/>
+              <a:t>Screen</a:t>
+            </a:r>
+            <a:endParaRPr lang="en-US" dirty="0" smtClean="0"/>
           </a:p>
           <a:p>
             <a:pPr marL="457200" lvl="0" indent="-228600" rtl="0">
@@ -7806,7 +8459,7 @@
         <p:spPr>
           <a:xfrm>
             <a:off x="311699" y="368673"/>
-            <a:ext cx="4256459" cy="942627"/>
+            <a:ext cx="3375605" cy="942627"/>
           </a:xfrm>
           <a:prstGeom prst="rect">
             <a:avLst/>
@@ -7818,15 +8471,14 @@
           </a:bodyPr>
           <a:lstStyle/>
           <a:p>
-            <a:pPr lvl="0">
-              <a:spcBef>
-                <a:spcPts val="0"/>
-              </a:spcBef>
-              <a:buNone/>
-            </a:pPr>
+            <a:pPr lvl="0"/>
+            <a:r>
+              <a:rPr lang="en-US" dirty="0"/>
+              <a:t>Clear the Zip Code </a:t>
+            </a:r>
             <a:r>
               <a:rPr lang="en-US" dirty="0" smtClean="0"/>
-              <a:t>Clear the Zip Code List</a:t>
+              <a:t>List</a:t>
             </a:r>
             <a:endParaRPr lang="en" dirty="0"/>
           </a:p>

</xml_diff>

<commit_message>
Fixing misnomer. Not a 7 day forecast. Just a forecast
</commit_message>
<xml_diff>
--- a/Phunware_Weather_App_Presentation.pptx
+++ b/Phunware_Weather_App_Presentation.pptx
@@ -585,20 +585,16 @@
               <a:buNone/>
             </a:pPr>
             <a:r>
-              <a:rPr lang="en-US" smtClean="0"/>
+              <a:rPr lang="en-US" dirty="0" smtClean="0"/>
               <a:t>Started</a:t>
             </a:r>
             <a:r>
-              <a:rPr lang="en-US" baseline="0" smtClean="0"/>
+              <a:rPr lang="en-US" baseline="0" dirty="0" smtClean="0"/>
               <a:t> 4/17/2016 - </a:t>
             </a:r>
             <a:r>
-              <a:rPr lang="en-US" smtClean="0"/>
-              <a:t>Completed </a:t>
-            </a:r>
-            <a:r>
               <a:rPr lang="en-US" dirty="0" smtClean="0"/>
-              <a:t>4/24/2016</a:t>
+              <a:t>Completed 4/24/2016</a:t>
             </a:r>
             <a:endParaRPr dirty="0"/>
           </a:p>
@@ -1105,7 +1101,7 @@
               </a:spcBef>
               <a:buNone/>
             </a:pPr>
-            <a:endParaRPr/>
+            <a:endParaRPr dirty="0"/>
           </a:p>
         </p:txBody>
       </p:sp>
@@ -7270,7 +7266,7 @@
             </a:pPr>
             <a:r>
               <a:rPr lang="en-US" dirty="0" smtClean="0"/>
-              <a:t>Current Weather Detail</a:t>
+              <a:t>Zip Code Weather Detail</a:t>
             </a:r>
             <a:endParaRPr lang="en" dirty="0" smtClean="0"/>
           </a:p>
@@ -7423,11 +7419,19 @@
           <a:p>
             <a:r>
               <a:rPr lang="en-US" sz="1800" dirty="0"/>
-              <a:t>Selecting zip code list item takes the user to </a:t>
+              <a:t>Selecting zip code list item takes the user </a:t>
+            </a:r>
+            <a:r>
+              <a:rPr lang="en-US" sz="1800"/>
+              <a:t>to </a:t>
+            </a:r>
+            <a:r>
+              <a:rPr lang="en-US" sz="1800" smtClean="0"/>
+              <a:t>weather </a:t>
             </a:r>
             <a:r>
               <a:rPr lang="en-US" sz="1800" dirty="0" smtClean="0"/>
-              <a:t>current weather detail</a:t>
+              <a:t>detail</a:t>
             </a:r>
           </a:p>
           <a:p>

</xml_diff>

<commit_message>
Adding Cache Unit tests
</commit_message>
<xml_diff>
--- a/Phunware_Weather_App_Presentation.pptx
+++ b/Phunware_Weather_App_Presentation.pptx
@@ -6604,7 +6604,7 @@
         <p:spPr>
           <a:xfrm>
             <a:off x="311700" y="1152475"/>
-            <a:ext cx="8520600" cy="3416400"/>
+            <a:ext cx="8520600" cy="3599310"/>
           </a:xfrm>
           <a:prstGeom prst="rect">
             <a:avLst/>
@@ -6698,6 +6698,18 @@
               <a:rPr lang="en-US" dirty="0" smtClean="0"/>
               <a:t>Add Location Options</a:t>
             </a:r>
+          </a:p>
+          <a:p>
+            <a:pPr marL="457200" lvl="0" indent="-228600" rtl="0">
+              <a:spcBef>
+                <a:spcPts val="0"/>
+              </a:spcBef>
+            </a:pPr>
+            <a:r>
+              <a:rPr lang="en-US" dirty="0" smtClean="0"/>
+              <a:t>Service API Unit Tests</a:t>
+            </a:r>
+            <a:endParaRPr lang="en-US" dirty="0" smtClean="0"/>
           </a:p>
         </p:txBody>
       </p:sp>
@@ -8503,7 +8515,15 @@
             </a:pPr>
             <a:r>
               <a:rPr lang="en-US" dirty="0" smtClean="0"/>
-              <a:t>Activity Unit Tests</a:t>
+              <a:t>Activity </a:t>
+            </a:r>
+            <a:r>
+              <a:rPr lang="en-US" dirty="0" smtClean="0"/>
+              <a:t>Instrumentation </a:t>
+            </a:r>
+            <a:r>
+              <a:rPr lang="en-US" dirty="0" smtClean="0"/>
+              <a:t>Tests</a:t>
             </a:r>
           </a:p>
           <a:p>
@@ -8513,12 +8533,8 @@
               </a:spcBef>
             </a:pPr>
             <a:r>
-              <a:rPr lang="en-US" dirty="0" err="1" smtClean="0"/>
-              <a:t>ServiceAPI</a:t>
-            </a:r>
-            <a:r>
               <a:rPr lang="en-US" dirty="0" smtClean="0"/>
-              <a:t> Unit Tests</a:t>
+              <a:t>Cache Unit Tests</a:t>
             </a:r>
             <a:endParaRPr lang="en" dirty="0"/>
           </a:p>

</xml_diff>

<commit_message>
Final presentation and README fix
</commit_message>
<xml_diff>
--- a/Phunware_Weather_App_Presentation.pptx
+++ b/Phunware_Weather_App_Presentation.pptx
@@ -1808,7 +1808,7 @@
               </a:spcBef>
               <a:buNone/>
             </a:pPr>
-            <a:endParaRPr/>
+            <a:endParaRPr dirty="0"/>
           </a:p>
         </p:txBody>
       </p:sp>
@@ -5877,7 +5877,7 @@
         </p:blipFill>
         <p:spPr>
           <a:xfrm>
-            <a:off x="6203913" y="191984"/>
+            <a:off x="6408762" y="304634"/>
             <a:ext cx="2402281" cy="4587900"/>
           </a:xfrm>
           <a:prstGeom prst="rect">
@@ -5907,7 +5907,7 @@
         </p:blipFill>
         <p:spPr>
           <a:xfrm>
-            <a:off x="3369995" y="191984"/>
+            <a:off x="3656786" y="304634"/>
             <a:ext cx="2580694" cy="4587900"/>
           </a:xfrm>
           <a:prstGeom prst="rect">
@@ -5999,7 +5999,7 @@
         <p:spPr>
           <a:xfrm>
             <a:off x="311699" y="555600"/>
-            <a:ext cx="2863479" cy="755700"/>
+            <a:ext cx="3160512" cy="755700"/>
           </a:xfrm>
         </p:spPr>
         <p:txBody>
@@ -6022,7 +6022,7 @@
         </p:nvCxnSpPr>
         <p:spPr>
           <a:xfrm flipH="1">
-            <a:off x="6770299" y="2037941"/>
+            <a:off x="6975149" y="2140351"/>
             <a:ext cx="1495407" cy="0"/>
           </a:xfrm>
           <a:prstGeom prst="straightConnector1">
@@ -6058,7 +6058,7 @@
         </p:nvCxnSpPr>
         <p:spPr>
           <a:xfrm flipH="1" flipV="1">
-            <a:off x="4341589" y="838540"/>
+            <a:off x="4500965" y="1033580"/>
             <a:ext cx="318753" cy="277720"/>
           </a:xfrm>
           <a:prstGeom prst="straightConnector1">
@@ -7495,7 +7495,7 @@
       </p:sp>
       <p:pic>
         <p:nvPicPr>
-          <p:cNvPr id="2" name="Picture 1" descr="ListView.png"/>
+          <p:cNvPr id="3" name="Picture 2" descr="Screenshot_20160424-212724.png"/>
           <p:cNvPicPr>
             <a:picLocks noChangeAspect="1"/>
           </p:cNvPicPr>
@@ -7515,8 +7515,8 @@
         </p:blipFill>
         <p:spPr>
           <a:xfrm>
-            <a:off x="5392242" y="204817"/>
-            <a:ext cx="2662798" cy="4733863"/>
+            <a:off x="5317910" y="204817"/>
+            <a:ext cx="2671248" cy="4748884"/>
           </a:xfrm>
           <a:prstGeom prst="rect">
             <a:avLst/>
@@ -7912,7 +7912,7 @@
       </p:sp>
       <p:pic>
         <p:nvPicPr>
-          <p:cNvPr id="2" name="Picture 1" descr="Add_zipcode.png"/>
+          <p:cNvPr id="4" name="Picture 3" descr="Screenshot_20160424-212731.png"/>
           <p:cNvPicPr>
             <a:picLocks noChangeAspect="1"/>
           </p:cNvPicPr>
@@ -7932,8 +7932,8 @@
         </p:blipFill>
         <p:spPr>
           <a:xfrm>
-            <a:off x="3558708" y="281652"/>
-            <a:ext cx="2566294" cy="4562301"/>
+            <a:off x="3472446" y="281652"/>
+            <a:ext cx="2580877" cy="4588226"/>
           </a:xfrm>
           <a:prstGeom prst="rect">
             <a:avLst/>
@@ -7942,7 +7942,7 @@
       </p:pic>
       <p:pic>
         <p:nvPicPr>
-          <p:cNvPr id="5" name="Picture 4" descr="Add_zipcode_error.png"/>
+          <p:cNvPr id="7" name="Picture 6" descr="Screenshot_20160424-213225.png"/>
           <p:cNvPicPr>
             <a:picLocks noChangeAspect="1"/>
           </p:cNvPicPr>
@@ -7962,8 +7962,8 @@
         </p:blipFill>
         <p:spPr>
           <a:xfrm>
-            <a:off x="6258154" y="281652"/>
-            <a:ext cx="2566294" cy="4562301"/>
+            <a:off x="6186711" y="281652"/>
+            <a:ext cx="2580694" cy="4587900"/>
           </a:xfrm>
           <a:prstGeom prst="rect">
             <a:avLst/>
@@ -8163,7 +8163,7 @@
       </p:pic>
       <p:pic>
         <p:nvPicPr>
-          <p:cNvPr id="4" name="Picture 3" descr="Screenshot_20160424-211506.png"/>
+          <p:cNvPr id="8" name="Picture 7" descr="Screenshot_20160424-213412.png"/>
           <p:cNvPicPr>
             <a:picLocks noChangeAspect="1"/>
           </p:cNvPicPr>
@@ -8183,8 +8183,8 @@
         </p:blipFill>
         <p:spPr>
           <a:xfrm>
-            <a:off x="6342983" y="399179"/>
-            <a:ext cx="2372029" cy="4216941"/>
+            <a:off x="6237924" y="289060"/>
+            <a:ext cx="2580694" cy="4587900"/>
           </a:xfrm>
           <a:prstGeom prst="rect">
             <a:avLst/>
@@ -8687,7 +8687,7 @@
       </p:sp>
       <p:pic>
         <p:nvPicPr>
-          <p:cNvPr id="3" name="Picture 2" descr="Screenshot_20160422-224905.png"/>
+          <p:cNvPr id="2" name="Picture 1" descr="Screenshot_20160424-212831.png"/>
           <p:cNvPicPr>
             <a:picLocks noChangeAspect="1"/>
           </p:cNvPicPr>
@@ -8707,8 +8707,8 @@
         </p:blipFill>
         <p:spPr>
           <a:xfrm>
-            <a:off x="3896963" y="368673"/>
-            <a:ext cx="2413658" cy="4290946"/>
+            <a:off x="3820691" y="335392"/>
+            <a:ext cx="2432378" cy="4324227"/>
           </a:xfrm>
           <a:prstGeom prst="rect">
             <a:avLst/>
@@ -8717,7 +8717,7 @@
       </p:pic>
       <p:pic>
         <p:nvPicPr>
-          <p:cNvPr id="4" name="Picture 3" descr="Screenshot_20160422-224910.png"/>
+          <p:cNvPr id="5" name="Picture 4" descr="Screenshot_20160424-212833.png"/>
           <p:cNvPicPr>
             <a:picLocks noChangeAspect="1"/>
           </p:cNvPicPr>
@@ -8737,7 +8737,7 @@
         </p:blipFill>
         <p:spPr>
           <a:xfrm>
-            <a:off x="6501625" y="368673"/>
+            <a:off x="6412046" y="368673"/>
             <a:ext cx="2413657" cy="4290946"/>
           </a:xfrm>
           <a:prstGeom prst="rect">

</xml_diff>